<commit_message>
mise en page à jour doc et pdf
</commit_message>
<xml_diff>
--- a/PW Presentations/persona et shéma de fonctionnement ecommerce.pptx
+++ b/PW Presentations/persona et shéma de fonctionnement ecommerce.pptx
@@ -3688,10 +3688,10 @@
       </p:grpSpPr>
       <p:sp>
         <p:nvSpPr>
-          <p:cNvPr id="4" name="Rectangle 3">
-            <a:extLst>
-              <a:ext uri="{FF2B5EF4-FFF2-40B4-BE49-F238E27FC236}">
-                <a16:creationId xmlns:a16="http://schemas.microsoft.com/office/drawing/2014/main" id="{FA22392D-0B6A-2C42-BF53-003D3F1F5366}"/>
+          <p:cNvPr id="3" name="Rectangle 2">
+            <a:extLst>
+              <a:ext uri="{FF2B5EF4-FFF2-40B4-BE49-F238E27FC236}">
+                <a16:creationId xmlns:a16="http://schemas.microsoft.com/office/drawing/2014/main" id="{738741EA-CB8B-3C4D-BDE9-ED4D81A0DACC}"/>
               </a:ext>
             </a:extLst>
           </p:cNvPr>
@@ -3700,37 +3700,26 @@
         </p:nvSpPr>
         <p:spPr>
           <a:xfrm>
-            <a:off x="-228601" y="-338667"/>
-            <a:ext cx="12649200" cy="7450667"/>
+            <a:off x="-457200" y="3883788"/>
+            <a:ext cx="12649200" cy="3640666"/>
           </a:xfrm>
           <a:prstGeom prst="rect">
             <a:avLst/>
           </a:prstGeom>
-          <a:gradFill flip="none" rotWithShape="1">
-            <a:gsLst>
-              <a:gs pos="0">
-                <a:schemeClr val="accent6">
-                  <a:lumMod val="75000"/>
-                </a:schemeClr>
-              </a:gs>
-              <a:gs pos="50000">
-                <a:schemeClr val="accent6">
-                  <a:lumMod val="60000"/>
-                  <a:lumOff val="40000"/>
-                </a:schemeClr>
-              </a:gs>
-              <a:gs pos="100000">
-                <a:schemeClr val="accent4">
-                  <a:lumMod val="60000"/>
-                  <a:lumOff val="40000"/>
-                </a:schemeClr>
-              </a:gs>
-            </a:gsLst>
-            <a:path path="circle">
-              <a:fillToRect t="100000" r="100000"/>
-            </a:path>
-            <a:tileRect l="-100000" b="-100000"/>
-          </a:gradFill>
+          <a:blipFill dpi="0" rotWithShape="1">
+            <a:blip r:embed="rId2">
+              <a:alphaModFix amt="70000"/>
+              <a:extLst>
+                <a:ext uri="{28A0092B-C50C-407E-A947-70E740481C1C}">
+                  <a14:useLocalDpi xmlns:a14="http://schemas.microsoft.com/office/drawing/2010/main" val="0"/>
+                </a:ext>
+              </a:extLst>
+            </a:blip>
+            <a:srcRect/>
+            <a:stretch>
+              <a:fillRect t="-113958"/>
+            </a:stretch>
+          </a:blipFill>
         </p:spPr>
         <p:style>
           <a:lnRef idx="2">
@@ -3753,9 +3742,101 @@
           <a:lstStyle/>
           <a:p>
             <a:pPr algn="ctr"/>
-            <a:r>
-              <a:rPr lang="fr-FR" sz="5400" dirty="0"/>
-              <a:t>Visuels Présentation Client OC Pizza </a:t>
+            <a:endParaRPr lang="fr-FR" dirty="0"/>
+          </a:p>
+        </p:txBody>
+      </p:sp>
+      <p:sp>
+        <p:nvSpPr>
+          <p:cNvPr id="5" name="Rectangle 4">
+            <a:extLst>
+              <a:ext uri="{FF2B5EF4-FFF2-40B4-BE49-F238E27FC236}">
+                <a16:creationId xmlns:a16="http://schemas.microsoft.com/office/drawing/2014/main" id="{F866B15C-0670-9044-B469-D4CEE1940203}"/>
+              </a:ext>
+            </a:extLst>
+          </p:cNvPr>
+          <p:cNvSpPr/>
+          <p:nvPr/>
+        </p:nvSpPr>
+        <p:spPr>
+          <a:xfrm>
+            <a:off x="-344557" y="-639950"/>
+            <a:ext cx="12649200" cy="3640666"/>
+          </a:xfrm>
+          <a:prstGeom prst="rect">
+            <a:avLst/>
+          </a:prstGeom>
+          <a:blipFill dpi="0" rotWithShape="1">
+            <a:blip r:embed="rId2">
+              <a:alphaModFix amt="70000"/>
+              <a:extLst>
+                <a:ext uri="{28A0092B-C50C-407E-A947-70E740481C1C}">
+                  <a14:useLocalDpi xmlns:a14="http://schemas.microsoft.com/office/drawing/2010/main" val="0"/>
+                </a:ext>
+              </a:extLst>
+            </a:blip>
+            <a:srcRect/>
+            <a:stretch>
+              <a:fillRect l="-891" t="5149" r="891" b="-119107"/>
+            </a:stretch>
+          </a:blipFill>
+        </p:spPr>
+        <p:style>
+          <a:lnRef idx="2">
+            <a:schemeClr val="accent1">
+              <a:shade val="50000"/>
+            </a:schemeClr>
+          </a:lnRef>
+          <a:fillRef idx="1">
+            <a:schemeClr val="accent1"/>
+          </a:fillRef>
+          <a:effectRef idx="0">
+            <a:schemeClr val="accent1"/>
+          </a:effectRef>
+          <a:fontRef idx="minor">
+            <a:schemeClr val="lt1"/>
+          </a:fontRef>
+        </p:style>
+        <p:txBody>
+          <a:bodyPr rtlCol="0" anchor="ctr"/>
+          <a:lstStyle/>
+          <a:p>
+            <a:pPr algn="ctr"/>
+            <a:endParaRPr lang="fr-FR" dirty="0"/>
+          </a:p>
+        </p:txBody>
+      </p:sp>
+      <p:sp>
+        <p:nvSpPr>
+          <p:cNvPr id="2" name="ZoneTexte 1">
+            <a:extLst>
+              <a:ext uri="{FF2B5EF4-FFF2-40B4-BE49-F238E27FC236}">
+                <a16:creationId xmlns:a16="http://schemas.microsoft.com/office/drawing/2014/main" id="{1CDAD971-F42A-8D4A-9D27-F4BC6FC25F18}"/>
+              </a:ext>
+            </a:extLst>
+          </p:cNvPr>
+          <p:cNvSpPr txBox="1"/>
+          <p:nvPr/>
+        </p:nvSpPr>
+        <p:spPr>
+          <a:xfrm>
+            <a:off x="3392556" y="3075057"/>
+            <a:ext cx="7005700" cy="707886"/>
+          </a:xfrm>
+          <a:prstGeom prst="rect">
+            <a:avLst/>
+          </a:prstGeom>
+          <a:noFill/>
+        </p:spPr>
+        <p:txBody>
+          <a:bodyPr wrap="none" rtlCol="0">
+            <a:spAutoFit/>
+          </a:bodyPr>
+          <a:lstStyle/>
+          <a:p>
+            <a:r>
+              <a:rPr lang="fr-FR" sz="4000" dirty="0"/>
+              <a:t>PRESENTATION CLIENT OC PIZZA </a:t>
             </a:r>
           </a:p>
         </p:txBody>
@@ -14144,37 +14225,26 @@
         </p:nvSpPr>
         <p:spPr>
           <a:xfrm>
-            <a:off x="-457200" y="3857284"/>
+            <a:off x="-457200" y="3883788"/>
             <a:ext cx="12649200" cy="3640666"/>
           </a:xfrm>
           <a:prstGeom prst="rect">
             <a:avLst/>
           </a:prstGeom>
-          <a:gradFill flip="none" rotWithShape="1">
-            <a:gsLst>
-              <a:gs pos="0">
-                <a:schemeClr val="accent6">
-                  <a:lumMod val="75000"/>
-                </a:schemeClr>
-              </a:gs>
-              <a:gs pos="50000">
-                <a:schemeClr val="accent6">
-                  <a:lumMod val="60000"/>
-                  <a:lumOff val="40000"/>
-                </a:schemeClr>
-              </a:gs>
-              <a:gs pos="100000">
-                <a:schemeClr val="accent4">
-                  <a:lumMod val="60000"/>
-                  <a:lumOff val="40000"/>
-                </a:schemeClr>
-              </a:gs>
-            </a:gsLst>
-            <a:path path="circle">
-              <a:fillToRect t="100000" r="100000"/>
-            </a:path>
-            <a:tileRect l="-100000" b="-100000"/>
-          </a:gradFill>
+          <a:blipFill dpi="0" rotWithShape="1">
+            <a:blip r:embed="rId2">
+              <a:alphaModFix amt="70000"/>
+              <a:extLst>
+                <a:ext uri="{28A0092B-C50C-407E-A947-70E740481C1C}">
+                  <a14:useLocalDpi xmlns:a14="http://schemas.microsoft.com/office/drawing/2010/main" val="0"/>
+                </a:ext>
+              </a:extLst>
+            </a:blip>
+            <a:srcRect/>
+            <a:stretch>
+              <a:fillRect t="-113958"/>
+            </a:stretch>
+          </a:blipFill>
         </p:spPr>
         <p:style>
           <a:lnRef idx="2">
@@ -14197,7 +14267,7 @@
           <a:lstStyle/>
           <a:p>
             <a:pPr algn="ctr"/>
-            <a:endParaRPr lang="fr-FR"/>
+            <a:endParaRPr lang="fr-FR" dirty="0"/>
           </a:p>
         </p:txBody>
       </p:sp>
@@ -14215,7 +14285,7 @@
         </p:nvSpPr>
         <p:spPr>
           <a:xfrm>
-            <a:off x="640274" y="3004235"/>
+            <a:off x="640275" y="3105834"/>
             <a:ext cx="10911449" cy="646331"/>
           </a:xfrm>
           <a:prstGeom prst="rect">
@@ -14232,7 +14302,7 @@
             <a:pPr algn="ctr"/>
             <a:r>
               <a:rPr lang="fr-FR" sz="3600" dirty="0">
-                <a:hlinkClick r:id="rId2"/>
+                <a:hlinkClick r:id="rId3"/>
               </a:rPr>
               <a:t>VOYONS LE CYCLE DE VIE D’UNE COMMANDE ENSEMBLE </a:t>
             </a:r>
@@ -14242,10 +14312,10 @@
       </p:sp>
       <p:sp>
         <p:nvSpPr>
-          <p:cNvPr id="28" name="Rectangle 27">
-            <a:extLst>
-              <a:ext uri="{FF2B5EF4-FFF2-40B4-BE49-F238E27FC236}">
-                <a16:creationId xmlns:a16="http://schemas.microsoft.com/office/drawing/2014/main" id="{759B83BB-B606-F44C-90A8-E815D1846832}"/>
+          <p:cNvPr id="5" name="Rectangle 4">
+            <a:extLst>
+              <a:ext uri="{FF2B5EF4-FFF2-40B4-BE49-F238E27FC236}">
+                <a16:creationId xmlns:a16="http://schemas.microsoft.com/office/drawing/2014/main" id="{5C7D7AB1-4DB6-F44D-AE5D-F60739B824B9}"/>
               </a:ext>
             </a:extLst>
           </p:cNvPr>
@@ -14254,37 +14324,26 @@
         </p:nvSpPr>
         <p:spPr>
           <a:xfrm>
-            <a:off x="-228601" y="-843149"/>
+            <a:off x="-344557" y="-639950"/>
             <a:ext cx="12649200" cy="3640666"/>
           </a:xfrm>
           <a:prstGeom prst="rect">
             <a:avLst/>
           </a:prstGeom>
-          <a:gradFill flip="none" rotWithShape="1">
-            <a:gsLst>
-              <a:gs pos="0">
-                <a:schemeClr val="accent6">
-                  <a:lumMod val="75000"/>
-                </a:schemeClr>
-              </a:gs>
-              <a:gs pos="50000">
-                <a:schemeClr val="accent6">
-                  <a:lumMod val="60000"/>
-                  <a:lumOff val="40000"/>
-                </a:schemeClr>
-              </a:gs>
-              <a:gs pos="100000">
-                <a:schemeClr val="accent4">
-                  <a:lumMod val="60000"/>
-                  <a:lumOff val="40000"/>
-                </a:schemeClr>
-              </a:gs>
-            </a:gsLst>
-            <a:path path="circle">
-              <a:fillToRect t="100000" r="100000"/>
-            </a:path>
-            <a:tileRect l="-100000" b="-100000"/>
-          </a:gradFill>
+          <a:blipFill dpi="0" rotWithShape="1">
+            <a:blip r:embed="rId2">
+              <a:alphaModFix amt="70000"/>
+              <a:extLst>
+                <a:ext uri="{28A0092B-C50C-407E-A947-70E740481C1C}">
+                  <a14:useLocalDpi xmlns:a14="http://schemas.microsoft.com/office/drawing/2010/main" val="0"/>
+                </a:ext>
+              </a:extLst>
+            </a:blip>
+            <a:srcRect/>
+            <a:stretch>
+              <a:fillRect l="-891" t="5149" r="891" b="-119107"/>
+            </a:stretch>
+          </a:blipFill>
         </p:spPr>
         <p:style>
           <a:lnRef idx="2">
@@ -14307,7 +14366,7 @@
           <a:lstStyle/>
           <a:p>
             <a:pPr algn="ctr"/>
-            <a:endParaRPr lang="fr-FR"/>
+            <a:endParaRPr lang="fr-FR" dirty="0"/>
           </a:p>
         </p:txBody>
       </p:sp>
@@ -14343,10 +14402,45 @@
       </p:grpSpPr>
       <p:sp>
         <p:nvSpPr>
-          <p:cNvPr id="4" name="Rectangle 3">
-            <a:extLst>
-              <a:ext uri="{FF2B5EF4-FFF2-40B4-BE49-F238E27FC236}">
-                <a16:creationId xmlns:a16="http://schemas.microsoft.com/office/drawing/2014/main" id="{D3D2B2B8-C7E5-A141-A4A4-DBE861BBC1D6}"/>
+          <p:cNvPr id="6" name="ZoneTexte 5">
+            <a:extLst>
+              <a:ext uri="{FF2B5EF4-FFF2-40B4-BE49-F238E27FC236}">
+                <a16:creationId xmlns:a16="http://schemas.microsoft.com/office/drawing/2014/main" id="{76C765EA-D15C-D246-974A-777D02D69D7A}"/>
+              </a:ext>
+            </a:extLst>
+          </p:cNvPr>
+          <p:cNvSpPr txBox="1"/>
+          <p:nvPr/>
+        </p:nvSpPr>
+        <p:spPr>
+          <a:xfrm>
+            <a:off x="3554555" y="3105834"/>
+            <a:ext cx="4625690" cy="646331"/>
+          </a:xfrm>
+          <a:prstGeom prst="rect">
+            <a:avLst/>
+          </a:prstGeom>
+          <a:noFill/>
+        </p:spPr>
+        <p:txBody>
+          <a:bodyPr wrap="none" rtlCol="0">
+            <a:spAutoFit/>
+          </a:bodyPr>
+          <a:lstStyle/>
+          <a:p>
+            <a:r>
+              <a:rPr lang="fr-FR" sz="3600" dirty="0"/>
+              <a:t>QUESTIONS/REPONSES </a:t>
+            </a:r>
+          </a:p>
+        </p:txBody>
+      </p:sp>
+      <p:sp>
+        <p:nvSpPr>
+          <p:cNvPr id="7" name="Rectangle 6">
+            <a:extLst>
+              <a:ext uri="{FF2B5EF4-FFF2-40B4-BE49-F238E27FC236}">
+                <a16:creationId xmlns:a16="http://schemas.microsoft.com/office/drawing/2014/main" id="{61F9DB63-9D22-3240-8B1A-9EAA504AE0AA}"/>
               </a:ext>
             </a:extLst>
           </p:cNvPr>
@@ -14355,37 +14449,26 @@
         </p:nvSpPr>
         <p:spPr>
           <a:xfrm>
-            <a:off x="-228600" y="3857284"/>
+            <a:off x="-228600" y="3870536"/>
             <a:ext cx="12649200" cy="3640666"/>
           </a:xfrm>
           <a:prstGeom prst="rect">
             <a:avLst/>
           </a:prstGeom>
-          <a:gradFill flip="none" rotWithShape="1">
-            <a:gsLst>
-              <a:gs pos="0">
-                <a:schemeClr val="accent6">
-                  <a:lumMod val="75000"/>
-                </a:schemeClr>
-              </a:gs>
-              <a:gs pos="50000">
-                <a:schemeClr val="accent6">
-                  <a:lumMod val="60000"/>
-                  <a:lumOff val="40000"/>
-                </a:schemeClr>
-              </a:gs>
-              <a:gs pos="100000">
-                <a:schemeClr val="accent4">
-                  <a:lumMod val="60000"/>
-                  <a:lumOff val="40000"/>
-                </a:schemeClr>
-              </a:gs>
-            </a:gsLst>
-            <a:path path="circle">
-              <a:fillToRect t="100000" r="100000"/>
-            </a:path>
-            <a:tileRect l="-100000" b="-100000"/>
-          </a:gradFill>
+          <a:blipFill dpi="0" rotWithShape="1">
+            <a:blip r:embed="rId2">
+              <a:alphaModFix amt="70000"/>
+              <a:extLst>
+                <a:ext uri="{28A0092B-C50C-407E-A947-70E740481C1C}">
+                  <a14:useLocalDpi xmlns:a14="http://schemas.microsoft.com/office/drawing/2010/main" val="0"/>
+                </a:ext>
+              </a:extLst>
+            </a:blip>
+            <a:srcRect/>
+            <a:stretch>
+              <a:fillRect t="-113958"/>
+            </a:stretch>
+          </a:blipFill>
         </p:spPr>
         <p:style>
           <a:lnRef idx="2">
@@ -14408,16 +14491,16 @@
           <a:lstStyle/>
           <a:p>
             <a:pPr algn="ctr"/>
-            <a:endParaRPr lang="fr-FR"/>
-          </a:p>
-        </p:txBody>
-      </p:sp>
-      <p:sp>
-        <p:nvSpPr>
-          <p:cNvPr id="5" name="Rectangle 4">
-            <a:extLst>
-              <a:ext uri="{FF2B5EF4-FFF2-40B4-BE49-F238E27FC236}">
-                <a16:creationId xmlns:a16="http://schemas.microsoft.com/office/drawing/2014/main" id="{28E8A135-6E08-D748-BCAE-95D43FBF7846}"/>
+            <a:endParaRPr lang="fr-FR" dirty="0"/>
+          </a:p>
+        </p:txBody>
+      </p:sp>
+      <p:sp>
+        <p:nvSpPr>
+          <p:cNvPr id="8" name="Rectangle 7">
+            <a:extLst>
+              <a:ext uri="{FF2B5EF4-FFF2-40B4-BE49-F238E27FC236}">
+                <a16:creationId xmlns:a16="http://schemas.microsoft.com/office/drawing/2014/main" id="{2319AF9F-19A9-AE4A-99C2-A97C95E8E5C3}"/>
               </a:ext>
             </a:extLst>
           </p:cNvPr>
@@ -14426,37 +14509,26 @@
         </p:nvSpPr>
         <p:spPr>
           <a:xfrm>
-            <a:off x="-228600" y="-639951"/>
+            <a:off x="-115957" y="-653202"/>
             <a:ext cx="12649200" cy="3640666"/>
           </a:xfrm>
           <a:prstGeom prst="rect">
             <a:avLst/>
           </a:prstGeom>
-          <a:gradFill flip="none" rotWithShape="1">
-            <a:gsLst>
-              <a:gs pos="0">
-                <a:schemeClr val="accent6">
-                  <a:lumMod val="75000"/>
-                </a:schemeClr>
-              </a:gs>
-              <a:gs pos="50000">
-                <a:schemeClr val="accent6">
-                  <a:lumMod val="60000"/>
-                  <a:lumOff val="40000"/>
-                </a:schemeClr>
-              </a:gs>
-              <a:gs pos="100000">
-                <a:schemeClr val="accent4">
-                  <a:lumMod val="60000"/>
-                  <a:lumOff val="40000"/>
-                </a:schemeClr>
-              </a:gs>
-            </a:gsLst>
-            <a:path path="circle">
-              <a:fillToRect t="100000" r="100000"/>
-            </a:path>
-            <a:tileRect l="-100000" b="-100000"/>
-          </a:gradFill>
+          <a:blipFill dpi="0" rotWithShape="1">
+            <a:blip r:embed="rId2">
+              <a:alphaModFix amt="70000"/>
+              <a:extLst>
+                <a:ext uri="{28A0092B-C50C-407E-A947-70E740481C1C}">
+                  <a14:useLocalDpi xmlns:a14="http://schemas.microsoft.com/office/drawing/2010/main" val="0"/>
+                </a:ext>
+              </a:extLst>
+            </a:blip>
+            <a:srcRect/>
+            <a:stretch>
+              <a:fillRect l="-891" t="5149" r="891" b="-119107"/>
+            </a:stretch>
+          </a:blipFill>
         </p:spPr>
         <p:style>
           <a:lnRef idx="2">
@@ -14479,42 +14551,7 @@
           <a:lstStyle/>
           <a:p>
             <a:pPr algn="ctr"/>
-            <a:endParaRPr lang="fr-FR"/>
-          </a:p>
-        </p:txBody>
-      </p:sp>
-      <p:sp>
-        <p:nvSpPr>
-          <p:cNvPr id="6" name="ZoneTexte 5">
-            <a:extLst>
-              <a:ext uri="{FF2B5EF4-FFF2-40B4-BE49-F238E27FC236}">
-                <a16:creationId xmlns:a16="http://schemas.microsoft.com/office/drawing/2014/main" id="{76C765EA-D15C-D246-974A-777D02D69D7A}"/>
-              </a:ext>
-            </a:extLst>
-          </p:cNvPr>
-          <p:cNvSpPr txBox="1"/>
-          <p:nvPr/>
-        </p:nvSpPr>
-        <p:spPr>
-          <a:xfrm>
-            <a:off x="3554555" y="3105834"/>
-            <a:ext cx="4625690" cy="646331"/>
-          </a:xfrm>
-          <a:prstGeom prst="rect">
-            <a:avLst/>
-          </a:prstGeom>
-          <a:noFill/>
-        </p:spPr>
-        <p:txBody>
-          <a:bodyPr wrap="none" rtlCol="0">
-            <a:spAutoFit/>
-          </a:bodyPr>
-          <a:lstStyle/>
-          <a:p>
-            <a:r>
-              <a:rPr lang="fr-FR" sz="3600" dirty="0"/>
-              <a:t>QUESTIONS/REPONSES </a:t>
-            </a:r>
+            <a:endParaRPr lang="fr-FR" dirty="0"/>
           </a:p>
         </p:txBody>
       </p:sp>
@@ -14550,10 +14587,45 @@
       </p:grpSpPr>
       <p:sp>
         <p:nvSpPr>
-          <p:cNvPr id="4" name="Rectangle 3">
-            <a:extLst>
-              <a:ext uri="{FF2B5EF4-FFF2-40B4-BE49-F238E27FC236}">
-                <a16:creationId xmlns:a16="http://schemas.microsoft.com/office/drawing/2014/main" id="{668B9C4D-D5A4-3248-AEF7-C64D260A3CD9}"/>
+          <p:cNvPr id="6" name="ZoneTexte 5">
+            <a:extLst>
+              <a:ext uri="{FF2B5EF4-FFF2-40B4-BE49-F238E27FC236}">
+                <a16:creationId xmlns:a16="http://schemas.microsoft.com/office/drawing/2014/main" id="{D5BC556F-48AB-7A4F-82FA-DD0AACBF6B18}"/>
+              </a:ext>
+            </a:extLst>
+          </p:cNvPr>
+          <p:cNvSpPr txBox="1"/>
+          <p:nvPr/>
+        </p:nvSpPr>
+        <p:spPr>
+          <a:xfrm>
+            <a:off x="2897718" y="3264063"/>
+            <a:ext cx="6396559" cy="646331"/>
+          </a:xfrm>
+          <a:prstGeom prst="rect">
+            <a:avLst/>
+          </a:prstGeom>
+          <a:noFill/>
+        </p:spPr>
+        <p:txBody>
+          <a:bodyPr wrap="none" rtlCol="0">
+            <a:spAutoFit/>
+          </a:bodyPr>
+          <a:lstStyle/>
+          <a:p>
+            <a:r>
+              <a:rPr lang="fr-FR" sz="3600" dirty="0"/>
+              <a:t>MERCI DE VOTRE PARTICIPATION </a:t>
+            </a:r>
+          </a:p>
+        </p:txBody>
+      </p:sp>
+      <p:sp>
+        <p:nvSpPr>
+          <p:cNvPr id="7" name="Rectangle 6">
+            <a:extLst>
+              <a:ext uri="{FF2B5EF4-FFF2-40B4-BE49-F238E27FC236}">
+                <a16:creationId xmlns:a16="http://schemas.microsoft.com/office/drawing/2014/main" id="{3BFAE008-ECB7-A24C-A1EC-4AFE01A579CD}"/>
               </a:ext>
             </a:extLst>
           </p:cNvPr>
@@ -14562,37 +14634,26 @@
         </p:nvSpPr>
         <p:spPr>
           <a:xfrm>
-            <a:off x="-228601" y="-843149"/>
-            <a:ext cx="12649200" cy="4043549"/>
+            <a:off x="-457200" y="4029562"/>
+            <a:ext cx="12649200" cy="3640666"/>
           </a:xfrm>
           <a:prstGeom prst="rect">
             <a:avLst/>
           </a:prstGeom>
-          <a:gradFill flip="none" rotWithShape="1">
-            <a:gsLst>
-              <a:gs pos="0">
-                <a:schemeClr val="accent6">
-                  <a:lumMod val="75000"/>
-                </a:schemeClr>
-              </a:gs>
-              <a:gs pos="50000">
-                <a:schemeClr val="accent6">
-                  <a:lumMod val="60000"/>
-                  <a:lumOff val="40000"/>
-                </a:schemeClr>
-              </a:gs>
-              <a:gs pos="100000">
-                <a:schemeClr val="accent4">
-                  <a:lumMod val="60000"/>
-                  <a:lumOff val="40000"/>
-                </a:schemeClr>
-              </a:gs>
-            </a:gsLst>
-            <a:path path="circle">
-              <a:fillToRect t="100000" r="100000"/>
-            </a:path>
-            <a:tileRect l="-100000" b="-100000"/>
-          </a:gradFill>
+          <a:blipFill dpi="0" rotWithShape="1">
+            <a:blip r:embed="rId2">
+              <a:alphaModFix amt="70000"/>
+              <a:extLst>
+                <a:ext uri="{28A0092B-C50C-407E-A947-70E740481C1C}">
+                  <a14:useLocalDpi xmlns:a14="http://schemas.microsoft.com/office/drawing/2010/main" val="0"/>
+                </a:ext>
+              </a:extLst>
+            </a:blip>
+            <a:srcRect/>
+            <a:stretch>
+              <a:fillRect t="-113958"/>
+            </a:stretch>
+          </a:blipFill>
         </p:spPr>
         <p:style>
           <a:lnRef idx="2">
@@ -14615,16 +14676,16 @@
           <a:lstStyle/>
           <a:p>
             <a:pPr algn="ctr"/>
-            <a:endParaRPr lang="fr-FR" sz="5400" dirty="0"/>
-          </a:p>
-        </p:txBody>
-      </p:sp>
-      <p:sp>
-        <p:nvSpPr>
-          <p:cNvPr id="5" name="Rectangle 4">
-            <a:extLst>
-              <a:ext uri="{FF2B5EF4-FFF2-40B4-BE49-F238E27FC236}">
-                <a16:creationId xmlns:a16="http://schemas.microsoft.com/office/drawing/2014/main" id="{81A06F6F-9035-654A-BBDB-773FB0740C13}"/>
+            <a:endParaRPr lang="fr-FR" dirty="0"/>
+          </a:p>
+        </p:txBody>
+      </p:sp>
+      <p:sp>
+        <p:nvSpPr>
+          <p:cNvPr id="8" name="Rectangle 7">
+            <a:extLst>
+              <a:ext uri="{FF2B5EF4-FFF2-40B4-BE49-F238E27FC236}">
+                <a16:creationId xmlns:a16="http://schemas.microsoft.com/office/drawing/2014/main" id="{CA935F05-30C5-6C45-995F-4C3724D28A90}"/>
               </a:ext>
             </a:extLst>
           </p:cNvPr>
@@ -14633,37 +14694,26 @@
         </p:nvSpPr>
         <p:spPr>
           <a:xfrm>
-            <a:off x="-254003" y="3974057"/>
-            <a:ext cx="12649200" cy="4043549"/>
+            <a:off x="-344557" y="-494176"/>
+            <a:ext cx="12649200" cy="3640666"/>
           </a:xfrm>
           <a:prstGeom prst="rect">
             <a:avLst/>
           </a:prstGeom>
-          <a:gradFill flip="none" rotWithShape="1">
-            <a:gsLst>
-              <a:gs pos="0">
-                <a:schemeClr val="accent6">
-                  <a:lumMod val="75000"/>
-                </a:schemeClr>
-              </a:gs>
-              <a:gs pos="50000">
-                <a:schemeClr val="accent6">
-                  <a:lumMod val="60000"/>
-                  <a:lumOff val="40000"/>
-                </a:schemeClr>
-              </a:gs>
-              <a:gs pos="100000">
-                <a:schemeClr val="accent4">
-                  <a:lumMod val="60000"/>
-                  <a:lumOff val="40000"/>
-                </a:schemeClr>
-              </a:gs>
-            </a:gsLst>
-            <a:path path="circle">
-              <a:fillToRect t="100000" r="100000"/>
-            </a:path>
-            <a:tileRect l="-100000" b="-100000"/>
-          </a:gradFill>
+          <a:blipFill dpi="0" rotWithShape="1">
+            <a:blip r:embed="rId2">
+              <a:alphaModFix amt="70000"/>
+              <a:extLst>
+                <a:ext uri="{28A0092B-C50C-407E-A947-70E740481C1C}">
+                  <a14:useLocalDpi xmlns:a14="http://schemas.microsoft.com/office/drawing/2010/main" val="0"/>
+                </a:ext>
+              </a:extLst>
+            </a:blip>
+            <a:srcRect/>
+            <a:stretch>
+              <a:fillRect l="-891" t="5149" r="891" b="-119107"/>
+            </a:stretch>
+          </a:blipFill>
         </p:spPr>
         <p:style>
           <a:lnRef idx="2">
@@ -14686,42 +14736,7 @@
           <a:lstStyle/>
           <a:p>
             <a:pPr algn="ctr"/>
-            <a:endParaRPr lang="fr-FR" sz="5400" dirty="0"/>
-          </a:p>
-        </p:txBody>
-      </p:sp>
-      <p:sp>
-        <p:nvSpPr>
-          <p:cNvPr id="6" name="ZoneTexte 5">
-            <a:extLst>
-              <a:ext uri="{FF2B5EF4-FFF2-40B4-BE49-F238E27FC236}">
-                <a16:creationId xmlns:a16="http://schemas.microsoft.com/office/drawing/2014/main" id="{D5BC556F-48AB-7A4F-82FA-DD0AACBF6B18}"/>
-              </a:ext>
-            </a:extLst>
-          </p:cNvPr>
-          <p:cNvSpPr txBox="1"/>
-          <p:nvPr/>
-        </p:nvSpPr>
-        <p:spPr>
-          <a:xfrm>
-            <a:off x="2897718" y="3264063"/>
-            <a:ext cx="6396559" cy="646331"/>
-          </a:xfrm>
-          <a:prstGeom prst="rect">
-            <a:avLst/>
-          </a:prstGeom>
-          <a:noFill/>
-        </p:spPr>
-        <p:txBody>
-          <a:bodyPr wrap="none" rtlCol="0">
-            <a:spAutoFit/>
-          </a:bodyPr>
-          <a:lstStyle/>
-          <a:p>
-            <a:r>
-              <a:rPr lang="fr-FR" sz="3600" dirty="0"/>
-              <a:t>MERCI DE VOTRE PARTICIPATION </a:t>
-            </a:r>
+            <a:endParaRPr lang="fr-FR" dirty="0"/>
           </a:p>
         </p:txBody>
       </p:sp>

</xml_diff>

<commit_message>
correction diagrammme ajout PPT et DOC
</commit_message>
<xml_diff>
--- a/PW Presentations/persona et shéma de fonctionnement ecommerce.pptx
+++ b/PW Presentations/persona et shéma de fonctionnement ecommerce.pptx
@@ -5,7 +5,7 @@
     <p:sldMasterId id="2147483744" r:id="rId1"/>
   </p:sldMasterIdLst>
   <p:notesMasterIdLst>
-    <p:notesMasterId r:id="rId11"/>
+    <p:notesMasterId r:id="rId12"/>
   </p:notesMasterIdLst>
   <p:sldIdLst>
     <p:sldId id="263" r:id="rId2"/>
@@ -15,8 +15,9 @@
     <p:sldId id="260" r:id="rId6"/>
     <p:sldId id="257" r:id="rId7"/>
     <p:sldId id="262" r:id="rId8"/>
-    <p:sldId id="265" r:id="rId9"/>
-    <p:sldId id="264" r:id="rId10"/>
+    <p:sldId id="266" r:id="rId9"/>
+    <p:sldId id="265" r:id="rId10"/>
+    <p:sldId id="264" r:id="rId11"/>
   </p:sldIdLst>
   <p:sldSz cx="12192000" cy="6858000"/>
   <p:notesSz cx="6858000" cy="9144000"/>
@@ -205,7 +206,7 @@
           <a:p>
             <a:fld id="{D096B689-EB75-1B4A-BCFE-0688FBBBB68D}" type="datetimeFigureOut">
               <a:rPr lang="fr-FR" smtClean="0"/>
-              <a:t>12/05/2021</a:t>
+              <a:t>26/05/2021</a:t>
             </a:fld>
             <a:endParaRPr lang="fr-FR"/>
           </a:p>
@@ -619,7 +620,7 @@
           <a:p>
             <a:fld id="{CC845781-86CD-A944-9445-314D87DFF735}" type="datetimeFigureOut">
               <a:rPr lang="fr-FR" smtClean="0"/>
-              <a:t>12/05/2021</a:t>
+              <a:t>26/05/2021</a:t>
             </a:fld>
             <a:endParaRPr lang="fr-FR" dirty="0"/>
           </a:p>
@@ -817,7 +818,7 @@
           <a:p>
             <a:fld id="{CC845781-86CD-A944-9445-314D87DFF735}" type="datetimeFigureOut">
               <a:rPr lang="fr-FR" smtClean="0"/>
-              <a:t>12/05/2021</a:t>
+              <a:t>26/05/2021</a:t>
             </a:fld>
             <a:endParaRPr lang="fr-FR" dirty="0"/>
           </a:p>
@@ -1025,7 +1026,7 @@
           <a:p>
             <a:fld id="{CC845781-86CD-A944-9445-314D87DFF735}" type="datetimeFigureOut">
               <a:rPr lang="fr-FR" smtClean="0"/>
-              <a:t>12/05/2021</a:t>
+              <a:t>26/05/2021</a:t>
             </a:fld>
             <a:endParaRPr lang="fr-FR" dirty="0"/>
           </a:p>
@@ -1223,7 +1224,7 @@
           <a:p>
             <a:fld id="{CC845781-86CD-A944-9445-314D87DFF735}" type="datetimeFigureOut">
               <a:rPr lang="fr-FR" smtClean="0"/>
-              <a:t>12/05/2021</a:t>
+              <a:t>26/05/2021</a:t>
             </a:fld>
             <a:endParaRPr lang="fr-FR" dirty="0"/>
           </a:p>
@@ -1498,7 +1499,7 @@
           <a:p>
             <a:fld id="{CC845781-86CD-A944-9445-314D87DFF735}" type="datetimeFigureOut">
               <a:rPr lang="fr-FR" smtClean="0"/>
-              <a:t>12/05/2021</a:t>
+              <a:t>26/05/2021</a:t>
             </a:fld>
             <a:endParaRPr lang="fr-FR" dirty="0"/>
           </a:p>
@@ -1763,7 +1764,7 @@
           <a:p>
             <a:fld id="{CC845781-86CD-A944-9445-314D87DFF735}" type="datetimeFigureOut">
               <a:rPr lang="fr-FR" smtClean="0"/>
-              <a:t>12/05/2021</a:t>
+              <a:t>26/05/2021</a:t>
             </a:fld>
             <a:endParaRPr lang="fr-FR" dirty="0"/>
           </a:p>
@@ -2175,7 +2176,7 @@
           <a:p>
             <a:fld id="{CC845781-86CD-A944-9445-314D87DFF735}" type="datetimeFigureOut">
               <a:rPr lang="fr-FR" smtClean="0"/>
-              <a:t>12/05/2021</a:t>
+              <a:t>26/05/2021</a:t>
             </a:fld>
             <a:endParaRPr lang="fr-FR" dirty="0"/>
           </a:p>
@@ -2316,7 +2317,7 @@
           <a:p>
             <a:fld id="{CC845781-86CD-A944-9445-314D87DFF735}" type="datetimeFigureOut">
               <a:rPr lang="fr-FR" smtClean="0"/>
-              <a:t>12/05/2021</a:t>
+              <a:t>26/05/2021</a:t>
             </a:fld>
             <a:endParaRPr lang="fr-FR" dirty="0"/>
           </a:p>
@@ -2429,7 +2430,7 @@
           <a:p>
             <a:fld id="{CC845781-86CD-A944-9445-314D87DFF735}" type="datetimeFigureOut">
               <a:rPr lang="fr-FR" smtClean="0"/>
-              <a:t>12/05/2021</a:t>
+              <a:t>26/05/2021</a:t>
             </a:fld>
             <a:endParaRPr lang="fr-FR" dirty="0"/>
           </a:p>
@@ -2740,7 +2741,7 @@
           <a:p>
             <a:fld id="{CC845781-86CD-A944-9445-314D87DFF735}" type="datetimeFigureOut">
               <a:rPr lang="fr-FR" smtClean="0"/>
-              <a:t>12/05/2021</a:t>
+              <a:t>26/05/2021</a:t>
             </a:fld>
             <a:endParaRPr lang="fr-FR" dirty="0"/>
           </a:p>
@@ -3028,7 +3029,7 @@
           <a:p>
             <a:fld id="{CC845781-86CD-A944-9445-314D87DFF735}" type="datetimeFigureOut">
               <a:rPr lang="fr-FR" smtClean="0"/>
-              <a:t>12/05/2021</a:t>
+              <a:t>26/05/2021</a:t>
             </a:fld>
             <a:endParaRPr lang="fr-FR" dirty="0"/>
           </a:p>
@@ -3269,7 +3270,7 @@
           <a:p>
             <a:fld id="{CC845781-86CD-A944-9445-314D87DFF735}" type="datetimeFigureOut">
               <a:rPr lang="fr-FR" smtClean="0"/>
-              <a:t>12/05/2021</a:t>
+              <a:t>26/05/2021</a:t>
             </a:fld>
             <a:endParaRPr lang="fr-FR" dirty="0"/>
           </a:p>
@@ -3854,6 +3855,191 @@
 </p:sld>
 </file>
 
+<file path=ppt/slides/slide10.xml><?xml version="1.0" encoding="utf-8"?>
+<p:sld xmlns:a="http://schemas.openxmlformats.org/drawingml/2006/main" xmlns:r="http://schemas.openxmlformats.org/officeDocument/2006/relationships" xmlns:p="http://schemas.openxmlformats.org/presentationml/2006/main">
+  <p:cSld>
+    <p:spTree>
+      <p:nvGrpSpPr>
+        <p:cNvPr id="1" name=""/>
+        <p:cNvGrpSpPr/>
+        <p:nvPr/>
+      </p:nvGrpSpPr>
+      <p:grpSpPr>
+        <a:xfrm>
+          <a:off x="0" y="0"/>
+          <a:ext cx="0" cy="0"/>
+          <a:chOff x="0" y="0"/>
+          <a:chExt cx="0" cy="0"/>
+        </a:xfrm>
+      </p:grpSpPr>
+      <p:sp>
+        <p:nvSpPr>
+          <p:cNvPr id="6" name="ZoneTexte 5">
+            <a:extLst>
+              <a:ext uri="{FF2B5EF4-FFF2-40B4-BE49-F238E27FC236}">
+                <a16:creationId xmlns:a16="http://schemas.microsoft.com/office/drawing/2014/main" id="{D5BC556F-48AB-7A4F-82FA-DD0AACBF6B18}"/>
+              </a:ext>
+            </a:extLst>
+          </p:cNvPr>
+          <p:cNvSpPr txBox="1"/>
+          <p:nvPr/>
+        </p:nvSpPr>
+        <p:spPr>
+          <a:xfrm>
+            <a:off x="2897718" y="3264063"/>
+            <a:ext cx="6396559" cy="646331"/>
+          </a:xfrm>
+          <a:prstGeom prst="rect">
+            <a:avLst/>
+          </a:prstGeom>
+          <a:noFill/>
+        </p:spPr>
+        <p:txBody>
+          <a:bodyPr wrap="none" rtlCol="0">
+            <a:spAutoFit/>
+          </a:bodyPr>
+          <a:lstStyle/>
+          <a:p>
+            <a:r>
+              <a:rPr lang="fr-FR" sz="3600" dirty="0"/>
+              <a:t>MERCI DE VOTRE PARTICIPATION </a:t>
+            </a:r>
+          </a:p>
+        </p:txBody>
+      </p:sp>
+      <p:sp>
+        <p:nvSpPr>
+          <p:cNvPr id="7" name="Rectangle 6">
+            <a:extLst>
+              <a:ext uri="{FF2B5EF4-FFF2-40B4-BE49-F238E27FC236}">
+                <a16:creationId xmlns:a16="http://schemas.microsoft.com/office/drawing/2014/main" id="{3BFAE008-ECB7-A24C-A1EC-4AFE01A579CD}"/>
+              </a:ext>
+            </a:extLst>
+          </p:cNvPr>
+          <p:cNvSpPr/>
+          <p:nvPr/>
+        </p:nvSpPr>
+        <p:spPr>
+          <a:xfrm>
+            <a:off x="-457200" y="4029562"/>
+            <a:ext cx="12649200" cy="3640666"/>
+          </a:xfrm>
+          <a:prstGeom prst="rect">
+            <a:avLst/>
+          </a:prstGeom>
+          <a:blipFill dpi="0" rotWithShape="1">
+            <a:blip r:embed="rId2">
+              <a:alphaModFix amt="70000"/>
+              <a:extLst>
+                <a:ext uri="{28A0092B-C50C-407E-A947-70E740481C1C}">
+                  <a14:useLocalDpi xmlns:a14="http://schemas.microsoft.com/office/drawing/2010/main" val="0"/>
+                </a:ext>
+              </a:extLst>
+            </a:blip>
+            <a:srcRect/>
+            <a:stretch>
+              <a:fillRect t="-113958"/>
+            </a:stretch>
+          </a:blipFill>
+        </p:spPr>
+        <p:style>
+          <a:lnRef idx="2">
+            <a:schemeClr val="accent1">
+              <a:shade val="50000"/>
+            </a:schemeClr>
+          </a:lnRef>
+          <a:fillRef idx="1">
+            <a:schemeClr val="accent1"/>
+          </a:fillRef>
+          <a:effectRef idx="0">
+            <a:schemeClr val="accent1"/>
+          </a:effectRef>
+          <a:fontRef idx="minor">
+            <a:schemeClr val="lt1"/>
+          </a:fontRef>
+        </p:style>
+        <p:txBody>
+          <a:bodyPr rtlCol="0" anchor="ctr"/>
+          <a:lstStyle/>
+          <a:p>
+            <a:pPr algn="ctr"/>
+            <a:endParaRPr lang="fr-FR" dirty="0"/>
+          </a:p>
+        </p:txBody>
+      </p:sp>
+      <p:sp>
+        <p:nvSpPr>
+          <p:cNvPr id="8" name="Rectangle 7">
+            <a:extLst>
+              <a:ext uri="{FF2B5EF4-FFF2-40B4-BE49-F238E27FC236}">
+                <a16:creationId xmlns:a16="http://schemas.microsoft.com/office/drawing/2014/main" id="{CA935F05-30C5-6C45-995F-4C3724D28A90}"/>
+              </a:ext>
+            </a:extLst>
+          </p:cNvPr>
+          <p:cNvSpPr/>
+          <p:nvPr/>
+        </p:nvSpPr>
+        <p:spPr>
+          <a:xfrm>
+            <a:off x="-344557" y="-494176"/>
+            <a:ext cx="12649200" cy="3640666"/>
+          </a:xfrm>
+          <a:prstGeom prst="rect">
+            <a:avLst/>
+          </a:prstGeom>
+          <a:blipFill dpi="0" rotWithShape="1">
+            <a:blip r:embed="rId2">
+              <a:alphaModFix amt="70000"/>
+              <a:extLst>
+                <a:ext uri="{28A0092B-C50C-407E-A947-70E740481C1C}">
+                  <a14:useLocalDpi xmlns:a14="http://schemas.microsoft.com/office/drawing/2010/main" val="0"/>
+                </a:ext>
+              </a:extLst>
+            </a:blip>
+            <a:srcRect/>
+            <a:stretch>
+              <a:fillRect l="-891" t="5149" r="891" b="-119107"/>
+            </a:stretch>
+          </a:blipFill>
+        </p:spPr>
+        <p:style>
+          <a:lnRef idx="2">
+            <a:schemeClr val="accent1">
+              <a:shade val="50000"/>
+            </a:schemeClr>
+          </a:lnRef>
+          <a:fillRef idx="1">
+            <a:schemeClr val="accent1"/>
+          </a:fillRef>
+          <a:effectRef idx="0">
+            <a:schemeClr val="accent1"/>
+          </a:effectRef>
+          <a:fontRef idx="minor">
+            <a:schemeClr val="lt1"/>
+          </a:fontRef>
+        </p:style>
+        <p:txBody>
+          <a:bodyPr rtlCol="0" anchor="ctr"/>
+          <a:lstStyle/>
+          <a:p>
+            <a:pPr algn="ctr"/>
+            <a:endParaRPr lang="fr-FR" dirty="0"/>
+          </a:p>
+        </p:txBody>
+      </p:sp>
+    </p:spTree>
+    <p:extLst>
+      <p:ext uri="{BB962C8B-B14F-4D97-AF65-F5344CB8AC3E}">
+        <p14:creationId xmlns:p14="http://schemas.microsoft.com/office/powerpoint/2010/main" val="3422467497"/>
+      </p:ext>
+    </p:extLst>
+  </p:cSld>
+  <p:clrMapOvr>
+    <a:masterClrMapping/>
+  </p:clrMapOvr>
+</p:sld>
+</file>
+
 <file path=ppt/slides/slide2.xml><?xml version="1.0" encoding="utf-8"?>
 <p:sld xmlns:a="http://schemas.openxmlformats.org/drawingml/2006/main" xmlns:r="http://schemas.openxmlformats.org/officeDocument/2006/relationships" xmlns:p="http://schemas.openxmlformats.org/presentationml/2006/main">
   <p:cSld>
@@ -14402,45 +14588,10 @@
       </p:grpSpPr>
       <p:sp>
         <p:nvSpPr>
-          <p:cNvPr id="6" name="ZoneTexte 5">
-            <a:extLst>
-              <a:ext uri="{FF2B5EF4-FFF2-40B4-BE49-F238E27FC236}">
-                <a16:creationId xmlns:a16="http://schemas.microsoft.com/office/drawing/2014/main" id="{76C765EA-D15C-D246-974A-777D02D69D7A}"/>
-              </a:ext>
-            </a:extLst>
-          </p:cNvPr>
-          <p:cNvSpPr txBox="1"/>
-          <p:nvPr/>
-        </p:nvSpPr>
-        <p:spPr>
-          <a:xfrm>
-            <a:off x="3554555" y="3105834"/>
-            <a:ext cx="4625690" cy="646331"/>
-          </a:xfrm>
-          <a:prstGeom prst="rect">
-            <a:avLst/>
-          </a:prstGeom>
-          <a:noFill/>
-        </p:spPr>
-        <p:txBody>
-          <a:bodyPr wrap="none" rtlCol="0">
-            <a:spAutoFit/>
-          </a:bodyPr>
-          <a:lstStyle/>
-          <a:p>
-            <a:r>
-              <a:rPr lang="fr-FR" sz="3600" dirty="0"/>
-              <a:t>QUESTIONS/REPONSES </a:t>
-            </a:r>
-          </a:p>
-        </p:txBody>
-      </p:sp>
-      <p:sp>
-        <p:nvSpPr>
-          <p:cNvPr id="7" name="Rectangle 6">
-            <a:extLst>
-              <a:ext uri="{FF2B5EF4-FFF2-40B4-BE49-F238E27FC236}">
-                <a16:creationId xmlns:a16="http://schemas.microsoft.com/office/drawing/2014/main" id="{61F9DB63-9D22-3240-8B1A-9EAA504AE0AA}"/>
+          <p:cNvPr id="4" name="Rectangle 3">
+            <a:extLst>
+              <a:ext uri="{FF2B5EF4-FFF2-40B4-BE49-F238E27FC236}">
+                <a16:creationId xmlns:a16="http://schemas.microsoft.com/office/drawing/2014/main" id="{8751DBC5-D880-6045-9E75-7D5E2985988C}"/>
               </a:ext>
             </a:extLst>
           </p:cNvPr>
@@ -14449,7 +14600,7 @@
         </p:nvSpPr>
         <p:spPr>
           <a:xfrm>
-            <a:off x="-228600" y="3870536"/>
+            <a:off x="-457200" y="3883788"/>
             <a:ext cx="12649200" cy="3640666"/>
           </a:xfrm>
           <a:prstGeom prst="rect">
@@ -14497,10 +14648,49 @@
       </p:sp>
       <p:sp>
         <p:nvSpPr>
-          <p:cNvPr id="8" name="Rectangle 7">
-            <a:extLst>
-              <a:ext uri="{FF2B5EF4-FFF2-40B4-BE49-F238E27FC236}">
-                <a16:creationId xmlns:a16="http://schemas.microsoft.com/office/drawing/2014/main" id="{2319AF9F-19A9-AE4A-99C2-A97C95E8E5C3}"/>
+          <p:cNvPr id="5" name="ZoneTexte 4">
+            <a:extLst>
+              <a:ext uri="{FF2B5EF4-FFF2-40B4-BE49-F238E27FC236}">
+                <a16:creationId xmlns:a16="http://schemas.microsoft.com/office/drawing/2014/main" id="{3557F183-9525-144E-864E-4005122B5E4B}"/>
+              </a:ext>
+            </a:extLst>
+          </p:cNvPr>
+          <p:cNvSpPr txBox="1"/>
+          <p:nvPr/>
+        </p:nvSpPr>
+        <p:spPr>
+          <a:xfrm>
+            <a:off x="2593549" y="3105834"/>
+            <a:ext cx="7004931" cy="646331"/>
+          </a:xfrm>
+          <a:prstGeom prst="rect">
+            <a:avLst/>
+          </a:prstGeom>
+          <a:noFill/>
+        </p:spPr>
+        <p:txBody>
+          <a:bodyPr wrap="none" rtlCol="0">
+            <a:spAutoFit/>
+          </a:bodyPr>
+          <a:lstStyle/>
+          <a:p>
+            <a:pPr algn="ctr"/>
+            <a:r>
+              <a:rPr lang="fr-FR" sz="3600" dirty="0">
+                <a:hlinkClick r:id="rId3"/>
+              </a:rPr>
+              <a:t>VOYONS LE DIAGRAMME D’ACTIVITE</a:t>
+            </a:r>
+            <a:endParaRPr lang="fr-FR" sz="3600" dirty="0"/>
+          </a:p>
+        </p:txBody>
+      </p:sp>
+      <p:sp>
+        <p:nvSpPr>
+          <p:cNvPr id="6" name="Rectangle 5">
+            <a:extLst>
+              <a:ext uri="{FF2B5EF4-FFF2-40B4-BE49-F238E27FC236}">
+                <a16:creationId xmlns:a16="http://schemas.microsoft.com/office/drawing/2014/main" id="{E39B2AF9-8E7C-EA4A-9B01-139D4BC6A3B0}"/>
               </a:ext>
             </a:extLst>
           </p:cNvPr>
@@ -14509,7 +14699,7 @@
         </p:nvSpPr>
         <p:spPr>
           <a:xfrm>
-            <a:off x="-115957" y="-653202"/>
+            <a:off x="-344557" y="-639950"/>
             <a:ext cx="12649200" cy="3640666"/>
           </a:xfrm>
           <a:prstGeom prst="rect">
@@ -14558,7 +14748,7 @@
     </p:spTree>
     <p:extLst>
       <p:ext uri="{BB962C8B-B14F-4D97-AF65-F5344CB8AC3E}">
-        <p14:creationId xmlns:p14="http://schemas.microsoft.com/office/powerpoint/2010/main" val="1956879979"/>
+        <p14:creationId xmlns:p14="http://schemas.microsoft.com/office/powerpoint/2010/main" val="1622161196"/>
       </p:ext>
     </p:extLst>
   </p:cSld>
@@ -14590,7 +14780,7 @@
           <p:cNvPr id="6" name="ZoneTexte 5">
             <a:extLst>
               <a:ext uri="{FF2B5EF4-FFF2-40B4-BE49-F238E27FC236}">
-                <a16:creationId xmlns:a16="http://schemas.microsoft.com/office/drawing/2014/main" id="{D5BC556F-48AB-7A4F-82FA-DD0AACBF6B18}"/>
+                <a16:creationId xmlns:a16="http://schemas.microsoft.com/office/drawing/2014/main" id="{76C765EA-D15C-D246-974A-777D02D69D7A}"/>
               </a:ext>
             </a:extLst>
           </p:cNvPr>
@@ -14599,8 +14789,8 @@
         </p:nvSpPr>
         <p:spPr>
           <a:xfrm>
-            <a:off x="2897718" y="3264063"/>
-            <a:ext cx="6396559" cy="646331"/>
+            <a:off x="3554555" y="3105834"/>
+            <a:ext cx="4625690" cy="646331"/>
           </a:xfrm>
           <a:prstGeom prst="rect">
             <a:avLst/>
@@ -14615,7 +14805,7 @@
           <a:p>
             <a:r>
               <a:rPr lang="fr-FR" sz="3600" dirty="0"/>
-              <a:t>MERCI DE VOTRE PARTICIPATION </a:t>
+              <a:t>QUESTIONS/REPONSES </a:t>
             </a:r>
           </a:p>
         </p:txBody>
@@ -14625,7 +14815,7 @@
           <p:cNvPr id="7" name="Rectangle 6">
             <a:extLst>
               <a:ext uri="{FF2B5EF4-FFF2-40B4-BE49-F238E27FC236}">
-                <a16:creationId xmlns:a16="http://schemas.microsoft.com/office/drawing/2014/main" id="{3BFAE008-ECB7-A24C-A1EC-4AFE01A579CD}"/>
+                <a16:creationId xmlns:a16="http://schemas.microsoft.com/office/drawing/2014/main" id="{61F9DB63-9D22-3240-8B1A-9EAA504AE0AA}"/>
               </a:ext>
             </a:extLst>
           </p:cNvPr>
@@ -14634,7 +14824,7 @@
         </p:nvSpPr>
         <p:spPr>
           <a:xfrm>
-            <a:off x="-457200" y="4029562"/>
+            <a:off x="-228600" y="3870536"/>
             <a:ext cx="12649200" cy="3640666"/>
           </a:xfrm>
           <a:prstGeom prst="rect">
@@ -14685,7 +14875,7 @@
           <p:cNvPr id="8" name="Rectangle 7">
             <a:extLst>
               <a:ext uri="{FF2B5EF4-FFF2-40B4-BE49-F238E27FC236}">
-                <a16:creationId xmlns:a16="http://schemas.microsoft.com/office/drawing/2014/main" id="{CA935F05-30C5-6C45-995F-4C3724D28A90}"/>
+                <a16:creationId xmlns:a16="http://schemas.microsoft.com/office/drawing/2014/main" id="{2319AF9F-19A9-AE4A-99C2-A97C95E8E5C3}"/>
               </a:ext>
             </a:extLst>
           </p:cNvPr>
@@ -14694,7 +14884,7 @@
         </p:nvSpPr>
         <p:spPr>
           <a:xfrm>
-            <a:off x="-344557" y="-494176"/>
+            <a:off x="-115957" y="-653202"/>
             <a:ext cx="12649200" cy="3640666"/>
           </a:xfrm>
           <a:prstGeom prst="rect">
@@ -14743,7 +14933,7 @@
     </p:spTree>
     <p:extLst>
       <p:ext uri="{BB962C8B-B14F-4D97-AF65-F5344CB8AC3E}">
-        <p14:creationId xmlns:p14="http://schemas.microsoft.com/office/powerpoint/2010/main" val="3422467497"/>
+        <p14:creationId xmlns:p14="http://schemas.microsoft.com/office/powerpoint/2010/main" val="1956879979"/>
       </p:ext>
     </p:extLst>
   </p:cSld>

</xml_diff>